<commit_message>
Update docs for Day 2.
</commit_message>
<xml_diff>
--- a/Servlets/Day2/Docs/Web Presentation-Part2.pptx
+++ b/Servlets/Day2/Docs/Web Presentation-Part2.pptx
@@ -246,7 +246,7 @@
             <a:fld id="{4F94E7C4-328C-457B-8CA2-EE381C323794}" type="datetimeFigureOut">
               <a:rPr lang="en-US" smtClean="0"/>
               <a:pPr/>
-              <a:t>7/17/2017</a:t>
+              <a:t>7/18/2017</a:t>
             </a:fld>
             <a:endParaRPr lang="en-US"/>
           </a:p>
@@ -5822,7 +5822,7 @@
             <a:fld id="{0DDD1723-F08C-BC4A-A158-087EDAF93B47}" type="datetimeFigureOut">
               <a:rPr lang="en-US"/>
               <a:pPr/>
-              <a:t>7/17/2017</a:t>
+              <a:t>7/18/2017</a:t>
             </a:fld>
             <a:endParaRPr lang="en-US"/>
           </a:p>
@@ -6343,8 +6343,8 @@
         </p:nvSpPr>
         <p:spPr>
           <a:xfrm>
-            <a:off x="4032069" y="5097998"/>
-            <a:ext cx="3890012" cy="1600438"/>
+            <a:off x="4032069" y="5252932"/>
+            <a:ext cx="3890012" cy="1354217"/>
           </a:xfrm>
           <a:prstGeom prst="rect">
             <a:avLst/>
@@ -6416,33 +6416,7 @@
                   <a:schemeClr val="bg1"/>
                 </a:solidFill>
               </a:rPr>
-              <a:t> 		Alexandru Krancevik</a:t>
-            </a:r>
-          </a:p>
-          <a:p>
-            <a:r>
-              <a:rPr lang="en-US" sz="1600" dirty="0" smtClean="0">
-                <a:solidFill>
-                  <a:schemeClr val="bg1"/>
-                </a:solidFill>
-              </a:rPr>
-              <a:t>		</a:t>
-            </a:r>
-            <a:r>
-              <a:rPr lang="en-US" sz="1600" dirty="0" err="1" smtClean="0">
-                <a:solidFill>
-                  <a:schemeClr val="bg1"/>
-                </a:solidFill>
-              </a:rPr>
-              <a:t>Tekin</a:t>
-            </a:r>
-            <a:r>
-              <a:rPr lang="en-US" sz="1600" dirty="0" smtClean="0">
-                <a:solidFill>
-                  <a:schemeClr val="bg1"/>
-                </a:solidFill>
-              </a:rPr>
-              <a:t> Omer-Ali</a:t>
+              <a:t> 		</a:t>
             </a:r>
             <a:endParaRPr lang="ro-RO" sz="1600" dirty="0">
               <a:solidFill>
@@ -7324,8 +7298,8 @@
         </p:nvSpPr>
         <p:spPr>
           <a:xfrm>
-            <a:off x="720724" y="1724025"/>
-            <a:ext cx="7704139" cy="4185761"/>
+            <a:off x="720724" y="1604281"/>
+            <a:ext cx="7802790" cy="4493538"/>
           </a:xfrm>
           <a:prstGeom prst="rect">
             <a:avLst/>
@@ -7343,11 +7317,11 @@
               <a:buChar char="•"/>
             </a:pPr>
             <a:r>
-              <a:rPr lang="en-US" sz="2400" dirty="0" smtClean="0"/>
+              <a:rPr lang="en-US" dirty="0" smtClean="0"/>
               <a:t> </a:t>
             </a:r>
             <a:r>
-              <a:rPr lang="en-US" sz="1600" b="1" dirty="0"/>
+              <a:rPr lang="en-US" b="1" dirty="0"/>
               <a:t>Getting a RequestDispatcher</a:t>
             </a:r>
           </a:p>
@@ -7360,19 +7334,19 @@
           </a:p>
           <a:p>
             <a:r>
-              <a:rPr lang="en-US" sz="1600" dirty="0" smtClean="0"/>
+              <a:rPr lang="en-US" dirty="0" smtClean="0"/>
               <a:t>protected void doPost(HttpServletRequest request,</a:t>
             </a:r>
           </a:p>
           <a:p>
             <a:r>
-              <a:rPr lang="en-US" sz="1600" dirty="0" smtClean="0"/>
+              <a:rPr lang="en-US" dirty="0" smtClean="0"/>
               <a:t>                      HttpServletResponse response)</a:t>
             </a:r>
           </a:p>
           <a:p>
             <a:r>
-              <a:rPr lang="en-US" sz="1600" dirty="0" smtClean="0"/>
+              <a:rPr lang="en-US" dirty="0" smtClean="0"/>
               <a:t>        throws ServletException, IOException {</a:t>
             </a:r>
           </a:p>
@@ -7381,28 +7355,28 @@
               <a:buFont typeface="Arial" pitchFamily="34" charset="0"/>
               <a:buChar char="•"/>
             </a:pPr>
-            <a:endParaRPr lang="en-US" sz="1600" dirty="0" smtClean="0"/>
-          </a:p>
-          <a:p>
-            <a:r>
-              <a:rPr lang="en-US" sz="1600" dirty="0" smtClean="0"/>
+            <a:endParaRPr lang="en-US" dirty="0" smtClean="0"/>
+          </a:p>
+          <a:p>
+            <a:r>
+              <a:rPr lang="en-US" dirty="0" smtClean="0"/>
               <a:t>  RequestDispatcher requestDispatcher =</a:t>
             </a:r>
           </a:p>
           <a:p>
             <a:r>
-              <a:rPr lang="en-US" sz="1600" dirty="0" smtClean="0"/>
+              <a:rPr lang="en-US" dirty="0" smtClean="0"/>
               <a:t>    request.getRequestDispatcher("/nextURL");</a:t>
             </a:r>
           </a:p>
           <a:p>
             <a:r>
-              <a:rPr lang="en-US" sz="1600" dirty="0" smtClean="0"/>
+              <a:rPr lang="en-US" dirty="0" smtClean="0"/>
               <a:t>}</a:t>
             </a:r>
           </a:p>
           <a:p>
-            <a:endParaRPr lang="en-US" sz="1600" b="1" dirty="0" smtClean="0"/>
+            <a:endParaRPr lang="en-US" b="1" dirty="0" smtClean="0"/>
           </a:p>
           <a:p>
             <a:pPr marL="285750" indent="-285750">
@@ -7410,25 +7384,25 @@
               <a:buChar char="•"/>
             </a:pPr>
             <a:r>
-              <a:rPr lang="en-US" sz="1600" b="1" dirty="0" smtClean="0"/>
+              <a:rPr lang="en-US" b="1" dirty="0" smtClean="0"/>
               <a:t>Call RequestDispatcher using either include() or forward() method:</a:t>
             </a:r>
           </a:p>
           <a:p>
-            <a:endParaRPr lang="en-US" sz="1600" b="1" dirty="0" smtClean="0"/>
-          </a:p>
-          <a:p>
-            <a:r>
-              <a:rPr lang="en-US" sz="1600" dirty="0" smtClean="0"/>
+            <a:endParaRPr lang="en-US" b="1" dirty="0" smtClean="0"/>
+          </a:p>
+          <a:p>
+            <a:r>
+              <a:rPr lang="en-US" dirty="0" smtClean="0"/>
               <a:t>requestDispatcher.forward(request, response);</a:t>
             </a:r>
           </a:p>
           <a:p>
-            <a:endParaRPr lang="en-US" sz="1600" dirty="0" smtClean="0"/>
-          </a:p>
-          <a:p>
-            <a:r>
-              <a:rPr lang="en-US" sz="1600" dirty="0" smtClean="0"/>
+            <a:endParaRPr lang="en-US" dirty="0" smtClean="0"/>
+          </a:p>
+          <a:p>
+            <a:r>
+              <a:rPr lang="en-US" dirty="0" smtClean="0"/>
               <a:t>requestDispatcher.include(request, response);</a:t>
             </a:r>
           </a:p>
@@ -7514,7 +7488,12 @@
             <p:ph idx="1"/>
           </p:nvPr>
         </p:nvSpPr>
-        <p:spPr/>
+        <p:spPr>
+          <a:xfrm>
+            <a:off x="720723" y="1447800"/>
+            <a:ext cx="7704139" cy="4690169"/>
+          </a:xfrm>
+        </p:spPr>
         <p:txBody>
           <a:bodyPr/>
           <a:lstStyle/>
@@ -7543,8 +7522,8 @@
         </p:nvSpPr>
         <p:spPr>
           <a:xfrm>
-            <a:off x="720724" y="1724026"/>
-            <a:ext cx="7704139" cy="5139869"/>
+            <a:off x="720724" y="1473655"/>
+            <a:ext cx="7704139" cy="5786199"/>
           </a:xfrm>
           <a:prstGeom prst="rect">
             <a:avLst/>
@@ -7558,87 +7537,87 @@
           <a:lstStyle/>
           <a:p>
             <a:r>
-              <a:rPr lang="en-US" sz="1600" dirty="0" smtClean="0"/>
+              <a:rPr lang="en-US" dirty="0" smtClean="0"/>
               <a:t>You can share data between two servlets by adding and retrieving attributes using the request object. In this case, the scope of the attributes will be “request”.</a:t>
             </a:r>
           </a:p>
           <a:p>
-            <a:endParaRPr lang="en-US" sz="1600" dirty="0" smtClean="0"/>
-          </a:p>
-          <a:p>
-            <a:r>
-              <a:rPr lang="en-US" sz="1600" dirty="0" smtClean="0"/>
+            <a:endParaRPr lang="en-US" dirty="0" smtClean="0"/>
+          </a:p>
+          <a:p>
+            <a:r>
+              <a:rPr lang="en-US" dirty="0" smtClean="0"/>
               <a:t>Method from HttpServletRequest:</a:t>
             </a:r>
           </a:p>
           <a:p>
             <a:r>
-              <a:rPr lang="en-US" sz="1600" b="1" dirty="0" smtClean="0"/>
+              <a:rPr lang="en-US" b="1" dirty="0" smtClean="0"/>
               <a:t>public void setAttribute(String name, Object o);</a:t>
             </a:r>
           </a:p>
           <a:p>
-            <a:endParaRPr lang="en-US" sz="1600" dirty="0" smtClean="0"/>
-          </a:p>
-          <a:p>
-            <a:r>
-              <a:rPr lang="en-US" sz="2000" b="1" dirty="0" smtClean="0"/>
+            <a:endParaRPr lang="en-US" dirty="0" smtClean="0"/>
+          </a:p>
+          <a:p>
+            <a:r>
+              <a:rPr lang="en-US" b="1" dirty="0" smtClean="0"/>
               <a:t>Example:</a:t>
             </a:r>
           </a:p>
           <a:p>
-            <a:endParaRPr lang="en-US" sz="1600" dirty="0" smtClean="0"/>
+            <a:endParaRPr lang="en-US" dirty="0" smtClean="0"/>
           </a:p>
           <a:p>
             <a:pPr lvl="1"/>
             <a:r>
-              <a:rPr lang="en-US" sz="1600" dirty="0" smtClean="0"/>
+              <a:rPr lang="en-US" dirty="0" smtClean="0"/>
               <a:t>Setting attribute:</a:t>
             </a:r>
           </a:p>
           <a:p>
             <a:pPr lvl="1"/>
             <a:r>
-              <a:rPr lang="en-US" sz="1600" b="1" dirty="0" smtClean="0"/>
+              <a:rPr lang="en-US" b="1" dirty="0" smtClean="0"/>
               <a:t>request.setAttribute("someAttribute", "someAttributeValue");</a:t>
             </a:r>
           </a:p>
           <a:p>
             <a:pPr lvl="1"/>
             <a:r>
-              <a:rPr lang="en-US" sz="1600" b="1" dirty="0" smtClean="0"/>
+              <a:rPr lang="en-US" b="1" dirty="0" smtClean="0"/>
               <a:t>RequestDispatcher requestDispatcher =</a:t>
             </a:r>
           </a:p>
           <a:p>
             <a:pPr lvl="1"/>
             <a:r>
-              <a:rPr lang="en-US" sz="1600" b="1" dirty="0" smtClean="0"/>
+              <a:rPr lang="en-US" b="1" dirty="0" smtClean="0"/>
               <a:t>					request.getRequestDispatcher("/nextURL");</a:t>
             </a:r>
           </a:p>
           <a:p>
             <a:pPr lvl="1"/>
             <a:r>
-              <a:rPr lang="en-US" sz="1600" b="1" dirty="0" smtClean="0"/>
+              <a:rPr lang="en-US" b="1" dirty="0" smtClean="0"/>
               <a:t>requestDispatcher.forward(request, response);</a:t>
             </a:r>
           </a:p>
           <a:p>
             <a:pPr lvl="1"/>
-            <a:endParaRPr lang="en-US" sz="1600" dirty="0" smtClean="0"/>
+            <a:endParaRPr lang="en-US" dirty="0" smtClean="0"/>
           </a:p>
           <a:p>
             <a:pPr lvl="1"/>
             <a:r>
-              <a:rPr lang="en-US" sz="1600" dirty="0" smtClean="0"/>
+              <a:rPr lang="en-US" dirty="0" smtClean="0"/>
               <a:t>Getting attribute:</a:t>
             </a:r>
           </a:p>
           <a:p>
             <a:pPr lvl="1"/>
             <a:r>
-              <a:rPr lang="en-US" sz="1600" b="1" dirty="0" smtClean="0"/>
+              <a:rPr lang="en-US" b="1" dirty="0" smtClean="0"/>
               <a:t>request.getAttribute("someAttribute");</a:t>
             </a:r>
           </a:p>
@@ -7771,8 +7750,8 @@
         </p:blipFill>
         <p:spPr bwMode="auto">
           <a:xfrm>
-            <a:off x="1195388" y="2314574"/>
-            <a:ext cx="7855930" cy="3239559"/>
+            <a:off x="476174" y="2042431"/>
+            <a:ext cx="8193238" cy="3737883"/>
           </a:xfrm>
           <a:prstGeom prst="rect">
             <a:avLst/>
@@ -7901,8 +7880,8 @@
         </p:blipFill>
         <p:spPr bwMode="auto">
           <a:xfrm>
-            <a:off x="1295400" y="2319338"/>
-            <a:ext cx="7549950" cy="2929995"/>
+            <a:off x="267983" y="2112509"/>
+            <a:ext cx="8876018" cy="3515405"/>
           </a:xfrm>
           <a:prstGeom prst="rect">
             <a:avLst/>
@@ -7991,7 +7970,7 @@
         <p:spPr>
           <a:xfrm>
             <a:off x="703172" y="1719840"/>
-            <a:ext cx="7725128" cy="923330"/>
+            <a:ext cx="7725128" cy="1015663"/>
           </a:xfrm>
           <a:prstGeom prst="rect">
             <a:avLst/>
@@ -8008,25 +7987,25 @@
               <a:buChar char="•"/>
             </a:pPr>
             <a:r>
-              <a:rPr lang="en-US" dirty="0"/>
+              <a:rPr lang="en-US" sz="2000" dirty="0"/>
               <a:t>Open file WorkShop </a:t>
             </a:r>
             <a:r>
-              <a:rPr lang="en-US" dirty="0" smtClean="0"/>
+              <a:rPr lang="en-US" sz="2000" dirty="0" smtClean="0"/>
               <a:t>1 </a:t>
             </a:r>
             <a:r>
-              <a:rPr lang="en-US" dirty="0"/>
+              <a:rPr lang="en-US" sz="2000" dirty="0"/>
               <a:t>- RequestDispatcherWorkshop.docx</a:t>
             </a:r>
-            <a:endParaRPr lang="en-US" dirty="0" smtClean="0"/>
+            <a:endParaRPr lang="en-US" sz="2000" dirty="0" smtClean="0"/>
           </a:p>
           <a:p>
             <a:pPr marL="285750" indent="-285750">
               <a:buFont typeface="Arial" panose="020B0604020202020204" pitchFamily="34" charset="0"/>
               <a:buChar char="•"/>
             </a:pPr>
-            <a:endParaRPr lang="en-US" b="1" dirty="0" smtClean="0"/>
+            <a:endParaRPr lang="en-US" sz="2000" b="1" dirty="0" smtClean="0"/>
           </a:p>
           <a:p>
             <a:pPr marL="285750" indent="-285750">
@@ -8034,10 +8013,10 @@
               <a:buChar char="•"/>
             </a:pPr>
             <a:r>
-              <a:rPr lang="en-US" dirty="0" smtClean="0"/>
+              <a:rPr lang="en-US" sz="2000" dirty="0" smtClean="0"/>
               <a:t>Begin workshop </a:t>
             </a:r>
-            <a:endParaRPr lang="en-US" dirty="0"/>
+            <a:endParaRPr lang="en-US" sz="2000" dirty="0"/>
           </a:p>
         </p:txBody>
       </p:sp>
@@ -8418,19 +8397,19 @@
           </a:p>
           <a:p>
             <a:pPr lvl="1"/>
-            <a:endParaRPr lang="en-US" dirty="0" smtClean="0"/>
+            <a:endParaRPr lang="en-US" sz="1800" dirty="0" smtClean="0"/>
           </a:p>
           <a:p>
             <a:pPr lvl="1"/>
             <a:r>
-              <a:rPr lang="en-US" dirty="0" smtClean="0"/>
+              <a:rPr lang="en-US" sz="1800" dirty="0" smtClean="0"/>
               <a:t>Java classes that can be used in Servlet Programming for:</a:t>
             </a:r>
           </a:p>
           <a:p>
             <a:pPr lvl="2"/>
             <a:r>
-              <a:rPr lang="en-US" dirty="0" smtClean="0"/>
+              <a:rPr lang="en-US" sz="1800" dirty="0" smtClean="0"/>
               <a:t>Intercepting requests from a client before they access </a:t>
             </a:r>
           </a:p>
@@ -8439,14 +8418,14 @@
               <a:buNone/>
             </a:pPr>
             <a:r>
-              <a:rPr lang="en-US" dirty="0" smtClean="0"/>
+              <a:rPr lang="en-US" sz="1800" dirty="0" smtClean="0"/>
               <a:t>a resource from the backend</a:t>
             </a:r>
           </a:p>
           <a:p>
             <a:pPr lvl="2"/>
             <a:r>
-              <a:rPr lang="en-US" dirty="0" smtClean="0"/>
+              <a:rPr lang="en-US" sz="1800" dirty="0" smtClean="0"/>
               <a:t>Manipulate responses from server before they are sent </a:t>
             </a:r>
           </a:p>
@@ -8455,7 +8434,7 @@
               <a:buNone/>
             </a:pPr>
             <a:r>
-              <a:rPr lang="en-US" dirty="0" smtClean="0"/>
+              <a:rPr lang="en-US" sz="1800" dirty="0" smtClean="0"/>
               <a:t>back to the client</a:t>
             </a:r>
           </a:p>
@@ -8527,7 +8506,7 @@
         <p:spPr bwMode="auto">
           <a:xfrm>
             <a:off x="1921193" y="3424238"/>
-            <a:ext cx="5460682" cy="2528093"/>
+            <a:ext cx="6190844" cy="2866131"/>
           </a:xfrm>
           <a:prstGeom prst="rect">
             <a:avLst/>
@@ -8875,8 +8854,8 @@
         </p:nvSpPr>
         <p:spPr>
           <a:xfrm>
-            <a:off x="554470" y="1596831"/>
-            <a:ext cx="8306898" cy="4524315"/>
+            <a:off x="554470" y="1270259"/>
+            <a:ext cx="8306898" cy="4924425"/>
           </a:xfrm>
           <a:prstGeom prst="rect">
             <a:avLst/>
@@ -8893,12 +8872,12 @@
           </a:p>
           <a:p>
             <a:pPr lvl="1"/>
-            <a:endParaRPr lang="en-US" dirty="0"/>
+            <a:endParaRPr lang="en-US" sz="2000" dirty="0"/>
           </a:p>
           <a:p>
             <a:pPr lvl="1"/>
             <a:r>
-              <a:rPr lang="en-US" dirty="0" smtClean="0"/>
+              <a:rPr lang="en-US" sz="2000" dirty="0" smtClean="0"/>
               <a:t>In order to create a filter you should use the following instructions:</a:t>
             </a:r>
           </a:p>
@@ -8907,14 +8886,14 @@
               <a:buFont typeface="Arial" pitchFamily="34" charset="0"/>
               <a:buChar char="•"/>
             </a:pPr>
-            <a:endParaRPr lang="en-US" dirty="0" smtClean="0"/>
+            <a:endParaRPr lang="en-US" sz="2000" dirty="0" smtClean="0"/>
           </a:p>
           <a:p>
             <a:pPr marL="800100" lvl="1" indent="-342900">
               <a:buAutoNum type="arabicPeriod"/>
             </a:pPr>
             <a:r>
-              <a:rPr lang="en-US" dirty="0" smtClean="0"/>
+              <a:rPr lang="en-US" sz="2000" dirty="0" smtClean="0"/>
               <a:t>Implement interface Filter from javax.servlet package</a:t>
             </a:r>
           </a:p>
@@ -8922,66 +8901,58 @@
             <a:pPr marL="800100" lvl="1" indent="-342900">
               <a:buAutoNum type="arabicPeriod"/>
             </a:pPr>
-            <a:endParaRPr lang="en-US" dirty="0" smtClean="0"/>
+            <a:endParaRPr lang="en-US" sz="2000" dirty="0" smtClean="0"/>
           </a:p>
           <a:p>
             <a:pPr lvl="1"/>
             <a:r>
-              <a:rPr lang="en-US" dirty="0" smtClean="0"/>
+              <a:rPr lang="en-US" sz="2000" dirty="0" smtClean="0"/>
               <a:t>2. Implement method init().   </a:t>
             </a:r>
           </a:p>
           <a:p>
             <a:pPr lvl="1"/>
-            <a:endParaRPr lang="en-US" dirty="0" smtClean="0"/>
+            <a:endParaRPr lang="en-US" sz="2000" dirty="0" smtClean="0"/>
           </a:p>
           <a:p>
             <a:pPr lvl="1"/>
             <a:r>
-              <a:rPr lang="en-US" dirty="0" smtClean="0"/>
+              <a:rPr lang="en-US" sz="2000" dirty="0" smtClean="0"/>
               <a:t>3. Implement method </a:t>
             </a:r>
             <a:r>
-              <a:rPr lang="en-US" b="1" dirty="0" smtClean="0"/>
+              <a:rPr lang="en-US" sz="2000" b="1" dirty="0" smtClean="0"/>
               <a:t>public void doFilter (ServletRequest, ServletResponse, FilterChain); </a:t>
             </a:r>
             <a:r>
-              <a:rPr lang="en-US" dirty="0" smtClean="0"/>
-              <a:t> In this method if you want to continue with the other filters in the chain add </a:t>
-            </a:r>
-            <a:r>
-              <a:rPr lang="en-US" dirty="0" smtClean="0"/>
-              <a:t>at </a:t>
-            </a:r>
-            <a:r>
-              <a:rPr lang="en-US" dirty="0" smtClean="0"/>
-              <a:t>the last code line the following instrunction </a:t>
-            </a:r>
-            <a:r>
-              <a:rPr lang="en-US" b="1" dirty="0"/>
+              <a:rPr lang="en-US" sz="2000" dirty="0" smtClean="0"/>
+              <a:t> In this method if you want to continue with the other filters in the chain add at the last code line the following instrunction </a:t>
+            </a:r>
+            <a:r>
+              <a:rPr lang="en-US" sz="2000" b="1" dirty="0"/>
               <a:t>chain.doFilter(request, response);</a:t>
             </a:r>
-            <a:endParaRPr lang="en-US" b="1" dirty="0" smtClean="0"/>
+            <a:endParaRPr lang="en-US" sz="2000" b="1" dirty="0" smtClean="0"/>
           </a:p>
           <a:p>
             <a:pPr lvl="1"/>
-            <a:endParaRPr lang="en-US" dirty="0" smtClean="0"/>
+            <a:endParaRPr lang="en-US" sz="2000" dirty="0" smtClean="0"/>
           </a:p>
           <a:p>
             <a:pPr lvl="1"/>
             <a:r>
-              <a:rPr lang="en-US" b="1" dirty="0" smtClean="0"/>
+              <a:rPr lang="en-US" sz="2000" b="1" dirty="0" smtClean="0"/>
               <a:t>4. </a:t>
             </a:r>
             <a:r>
-              <a:rPr lang="en-US" dirty="0" smtClean="0"/>
+              <a:rPr lang="en-US" sz="2000" dirty="0" smtClean="0"/>
               <a:t>Implement method </a:t>
             </a:r>
             <a:r>
-              <a:rPr lang="en-US" b="1" dirty="0" smtClean="0"/>
+              <a:rPr lang="en-US" sz="2000" b="1" dirty="0" smtClean="0"/>
               <a:t>public void destroy()</a:t>
             </a:r>
-            <a:endParaRPr lang="en-US" dirty="0" smtClean="0"/>
+            <a:endParaRPr lang="en-US" sz="2000" dirty="0" smtClean="0"/>
           </a:p>
           <a:p>
             <a:pPr lvl="2">
@@ -9096,7 +9067,7 @@
         <p:spPr>
           <a:xfrm>
             <a:off x="720723" y="1600201"/>
-            <a:ext cx="7974390" cy="4247317"/>
+            <a:ext cx="7974390" cy="4985980"/>
           </a:xfrm>
           <a:prstGeom prst="rect">
             <a:avLst/>
@@ -9110,106 +9081,106 @@
           <a:p>
             <a:pPr lvl="1"/>
             <a:r>
-              <a:rPr lang="en-US" dirty="0" smtClean="0"/>
+              <a:rPr lang="en-US" sz="2000" dirty="0" smtClean="0"/>
               <a:t>5. Declare the filter in </a:t>
             </a:r>
             <a:r>
-              <a:rPr lang="en-US" b="1" dirty="0" smtClean="0"/>
+              <a:rPr lang="en-US" sz="2000" b="1" dirty="0" smtClean="0"/>
               <a:t>web.xml </a:t>
             </a:r>
             <a:r>
-              <a:rPr lang="en-US" dirty="0" smtClean="0"/>
+              <a:rPr lang="en-US" sz="2000" dirty="0" smtClean="0"/>
               <a:t>deployment descriptor</a:t>
             </a:r>
           </a:p>
           <a:p>
             <a:pPr lvl="1"/>
             <a:r>
-              <a:rPr lang="en-US" b="1" dirty="0" smtClean="0"/>
+              <a:rPr lang="en-US" sz="2000" b="1" dirty="0" smtClean="0"/>
               <a:t>&lt;filter&gt;</a:t>
             </a:r>
           </a:p>
           <a:p>
             <a:pPr lvl="1"/>
             <a:r>
-              <a:rPr lang="en-US" b="1" dirty="0" smtClean="0"/>
+              <a:rPr lang="en-US" sz="2000" b="1" dirty="0" smtClean="0"/>
               <a:t>   &lt;filter-name&gt;SomeFilter&lt;/filter-name&gt;</a:t>
             </a:r>
           </a:p>
           <a:p>
             <a:pPr lvl="1"/>
             <a:r>
-              <a:rPr lang="en-US" b="1" dirty="0" smtClean="0"/>
+              <a:rPr lang="en-US" sz="2000" b="1" dirty="0" smtClean="0"/>
               <a:t>   &lt;filter-class&gt;ro.teamnet.z2h.SomeFilter&lt;/filter-class&gt;</a:t>
             </a:r>
           </a:p>
           <a:p>
             <a:pPr lvl="1"/>
             <a:r>
-              <a:rPr lang="en-US" b="1" dirty="0" smtClean="0"/>
+              <a:rPr lang="en-US" sz="2000" b="1" dirty="0" smtClean="0"/>
               <a:t>   &lt;init-param&gt;</a:t>
             </a:r>
           </a:p>
           <a:p>
             <a:pPr lvl="1"/>
             <a:r>
-              <a:rPr lang="en-US" b="1" dirty="0" smtClean="0"/>
+              <a:rPr lang="en-US" sz="2000" b="1" dirty="0" smtClean="0"/>
               <a:t>	  &lt;param-name&gt;someInitParam&lt;/param-name&gt;</a:t>
             </a:r>
           </a:p>
           <a:p>
             <a:pPr lvl="1"/>
             <a:r>
-              <a:rPr lang="en-US" b="1" dirty="0" smtClean="0"/>
+              <a:rPr lang="en-US" sz="2000" b="1" dirty="0" smtClean="0"/>
               <a:t>	  &lt;param-value&gt;Init Parameter Value&lt;/param-value&gt;</a:t>
             </a:r>
           </a:p>
           <a:p>
             <a:pPr lvl="1"/>
             <a:r>
-              <a:rPr lang="en-US" b="1" dirty="0" smtClean="0"/>
+              <a:rPr lang="en-US" sz="2000" b="1" dirty="0" smtClean="0"/>
               <a:t>   &lt;/init-param&gt;</a:t>
             </a:r>
           </a:p>
           <a:p>
             <a:pPr lvl="1"/>
             <a:r>
-              <a:rPr lang="en-US" b="1" dirty="0" smtClean="0"/>
+              <a:rPr lang="en-US" sz="2000" b="1" dirty="0" smtClean="0"/>
               <a:t>&lt;/filter&gt;</a:t>
             </a:r>
           </a:p>
           <a:p>
             <a:pPr lvl="1"/>
             <a:r>
-              <a:rPr lang="en-US" dirty="0" smtClean="0"/>
+              <a:rPr lang="en-US" sz="2000" dirty="0" smtClean="0"/>
               <a:t>6. Map the Filter to the components/url that you want this filter to apply</a:t>
             </a:r>
           </a:p>
           <a:p>
             <a:pPr lvl="1"/>
             <a:r>
-              <a:rPr lang="en-US" b="1" dirty="0" smtClean="0"/>
+              <a:rPr lang="en-US" sz="2000" b="1" dirty="0" smtClean="0"/>
               <a:t>&lt;filter-mapping&gt;</a:t>
             </a:r>
           </a:p>
           <a:p>
             <a:pPr lvl="1"/>
             <a:r>
-              <a:rPr lang="en-US" b="1" dirty="0" smtClean="0"/>
+              <a:rPr lang="en-US" sz="2000" b="1" dirty="0" smtClean="0"/>
               <a:t>   &lt;filter-name&gt;SomeFilter&lt;/filter-name&gt;</a:t>
             </a:r>
           </a:p>
           <a:p>
             <a:pPr lvl="1"/>
             <a:r>
-              <a:rPr lang="en-US" b="1" dirty="0" smtClean="0"/>
+              <a:rPr lang="en-US" sz="2000" b="1" dirty="0" smtClean="0"/>
               <a:t>   &lt;url-pattern&gt;/someURL&lt;/url-pattern&gt;</a:t>
             </a:r>
           </a:p>
           <a:p>
             <a:pPr lvl="1"/>
             <a:r>
-              <a:rPr lang="en-US" b="1" dirty="0" smtClean="0"/>
+              <a:rPr lang="en-US" sz="2000" b="1" dirty="0" smtClean="0"/>
               <a:t>&lt;/filter-mapping&gt;</a:t>
             </a:r>
           </a:p>
@@ -9266,7 +9237,12 @@
             <p:ph type="title"/>
           </p:nvPr>
         </p:nvSpPr>
-        <p:spPr/>
+        <p:spPr>
+          <a:xfrm>
+            <a:off x="852756" y="766826"/>
+            <a:ext cx="3664816" cy="593092"/>
+          </a:xfrm>
+        </p:spPr>
         <p:txBody>
           <a:bodyPr/>
           <a:lstStyle/>
@@ -9288,7 +9264,7 @@
         <p:spPr>
           <a:xfrm>
             <a:off x="703172" y="1719840"/>
-            <a:ext cx="7725128" cy="923330"/>
+            <a:ext cx="7725128" cy="1015663"/>
           </a:xfrm>
           <a:prstGeom prst="rect">
             <a:avLst/>
@@ -9305,24 +9281,24 @@
               <a:buChar char="•"/>
             </a:pPr>
             <a:r>
-              <a:rPr lang="en-US" dirty="0"/>
+              <a:rPr lang="en-US" sz="2000" dirty="0"/>
               <a:t>Open file WorkShop </a:t>
             </a:r>
             <a:r>
-              <a:rPr lang="en-US" dirty="0" smtClean="0"/>
+              <a:rPr lang="en-US" sz="2000" dirty="0" smtClean="0"/>
               <a:t>2 </a:t>
             </a:r>
             <a:r>
-              <a:rPr lang="en-US" dirty="0"/>
+              <a:rPr lang="en-US" sz="2000" dirty="0"/>
               <a:t>- </a:t>
             </a:r>
             <a:r>
-              <a:rPr lang="en-US" dirty="0" smtClean="0"/>
+              <a:rPr lang="en-US" sz="2000" dirty="0" smtClean="0"/>
               <a:t>ServletFilters.docx</a:t>
             </a:r>
           </a:p>
           <a:p>
-            <a:endParaRPr lang="en-US" b="1" dirty="0" smtClean="0"/>
+            <a:endParaRPr lang="en-US" sz="2000" b="1" dirty="0" smtClean="0"/>
           </a:p>
           <a:p>
             <a:pPr marL="285750" indent="-285750">
@@ -9330,10 +9306,10 @@
               <a:buChar char="•"/>
             </a:pPr>
             <a:r>
-              <a:rPr lang="en-US" dirty="0" smtClean="0"/>
+              <a:rPr lang="en-US" sz="2000" dirty="0" smtClean="0"/>
               <a:t>Begin workshop </a:t>
             </a:r>
-            <a:endParaRPr lang="en-US" dirty="0"/>
+            <a:endParaRPr lang="en-US" sz="2000" dirty="0"/>
           </a:p>
         </p:txBody>
       </p:sp>
@@ -9510,13 +9486,13 @@
         </p:nvSpPr>
         <p:spPr>
           <a:xfrm>
-            <a:off x="607834" y="2064026"/>
+            <a:off x="607834" y="1868083"/>
             <a:ext cx="8107187" cy="4415797"/>
           </a:xfrm>
         </p:spPr>
         <p:txBody>
           <a:bodyPr>
-            <a:normAutofit/>
+            <a:normAutofit lnSpcReduction="10000"/>
           </a:bodyPr>
           <a:lstStyle/>
           <a:p>
@@ -9528,7 +9504,7 @@
           <a:p>
             <a:pPr lvl="1"/>
             <a:r>
-              <a:rPr lang="en-US" sz="1800" dirty="0" smtClean="0"/>
+              <a:rPr lang="en-US" sz="2000" dirty="0" smtClean="0"/>
               <a:t>It is stateless - it cannot keep the conversational state between requests received from the same user</a:t>
             </a:r>
           </a:p>
@@ -9536,50 +9512,50 @@
             <a:pPr marL="457200" lvl="1" indent="0">
               <a:buNone/>
             </a:pPr>
-            <a:endParaRPr lang="en-US" sz="1800" dirty="0" smtClean="0"/>
-          </a:p>
-          <a:p>
-            <a:r>
-              <a:rPr lang="en-US" sz="2200" b="1" dirty="0" smtClean="0"/>
+            <a:endParaRPr lang="en-US" sz="2000" dirty="0" smtClean="0"/>
+          </a:p>
+          <a:p>
+            <a:r>
+              <a:rPr lang="en-US" sz="2000" b="1" dirty="0" smtClean="0"/>
               <a:t>Fix</a:t>
             </a:r>
           </a:p>
           <a:p>
             <a:pPr lvl="1"/>
             <a:r>
-              <a:rPr lang="en-US" sz="1800" dirty="0" smtClean="0"/>
+              <a:rPr lang="en-US" sz="2000" dirty="0" smtClean="0"/>
               <a:t>The problem was solved by adding a specific attribute to our requests, </a:t>
             </a:r>
             <a:r>
-              <a:rPr lang="en-US" sz="1800" b="1" dirty="0" smtClean="0"/>
+              <a:rPr lang="en-US" sz="2000" b="1" dirty="0" smtClean="0"/>
               <a:t>JSESSIONID</a:t>
             </a:r>
           </a:p>
           <a:p>
             <a:pPr lvl="1"/>
             <a:r>
-              <a:rPr lang="en-US" sz="1800" dirty="0" smtClean="0"/>
+              <a:rPr lang="en-US" sz="2000" dirty="0" smtClean="0"/>
               <a:t>By using this JSESSIONID, the Servlet Container knows how to re-establish the conversational state of the same client between requests</a:t>
             </a:r>
           </a:p>
           <a:p>
             <a:pPr lvl="1"/>
             <a:r>
-              <a:rPr lang="en-US" sz="1800" dirty="0" smtClean="0"/>
+              <a:rPr lang="en-US" sz="2000" dirty="0" smtClean="0"/>
               <a:t>If the request does not contain the JSESSIONID, a new conversational state will be registered to the client by associating a new JSESSIONID</a:t>
             </a:r>
           </a:p>
           <a:p>
             <a:pPr lvl="1"/>
             <a:r>
-              <a:rPr lang="en-US" sz="1800" dirty="0" smtClean="0"/>
+              <a:rPr lang="en-US" sz="2000" dirty="0" smtClean="0"/>
               <a:t>This conversation state is represented in the Servlet API by the type </a:t>
             </a:r>
             <a:r>
-              <a:rPr lang="en-US" sz="1800" b="1" dirty="0" smtClean="0"/>
+              <a:rPr lang="en-US" sz="2000" b="1" dirty="0" smtClean="0"/>
               <a:t>HttpSession</a:t>
             </a:r>
-            <a:endParaRPr lang="en-US" sz="1800" dirty="0" smtClean="0"/>
+            <a:endParaRPr lang="en-US" sz="2000" dirty="0" smtClean="0"/>
           </a:p>
           <a:p>
             <a:endParaRPr lang="en-US" dirty="0"/>
@@ -10155,13 +10131,13 @@
           <a:p>
             <a:pPr lvl="2" algn="l"/>
             <a:r>
-              <a:rPr lang="en-US" sz="4000" dirty="0" err="1" smtClean="0">
+              <a:rPr lang="en-US" sz="4000" b="1" dirty="0" err="1" smtClean="0">
                 <a:hlinkClick r:id="rId2"/>
               </a:rPr>
               <a:t>getAttribute</a:t>
             </a:r>
             <a:r>
-              <a:rPr lang="en-US" sz="4000" dirty="0" smtClean="0"/>
+              <a:rPr lang="en-US" sz="4000" b="1" dirty="0" smtClean="0"/>
               <a:t>(</a:t>
             </a:r>
             <a:r>
@@ -10315,7 +10291,7 @@
           <a:p>
             <a:pPr lvl="2" algn="l"/>
             <a:r>
-              <a:rPr lang="en-US" sz="4000" b="1" dirty="0" err="1" smtClean="0">
+              <a:rPr lang="en-US" sz="4000" b="1" dirty="0" smtClean="0">
                 <a:hlinkClick r:id="rId2"/>
               </a:rPr>
               <a:t>setMaxInactiveInterval</a:t>
@@ -10556,7 +10532,7 @@
         <p:spPr>
           <a:xfrm>
             <a:off x="703172" y="1719840"/>
-            <a:ext cx="7725128" cy="923330"/>
+            <a:ext cx="7725128" cy="1015663"/>
           </a:xfrm>
           <a:prstGeom prst="rect">
             <a:avLst/>
@@ -10573,25 +10549,25 @@
               <a:buChar char="•"/>
             </a:pPr>
             <a:r>
-              <a:rPr lang="en-US" dirty="0"/>
+              <a:rPr lang="en-US" sz="2000" dirty="0"/>
               <a:t>Open file WorkShop </a:t>
             </a:r>
             <a:r>
-              <a:rPr lang="en-US" dirty="0" smtClean="0"/>
+              <a:rPr lang="en-US" sz="2000" dirty="0" smtClean="0"/>
               <a:t>3 </a:t>
             </a:r>
             <a:r>
-              <a:rPr lang="en-US" dirty="0"/>
+              <a:rPr lang="en-US" sz="2000" dirty="0"/>
               <a:t>- HttpSession.docx</a:t>
             </a:r>
-            <a:endParaRPr lang="en-US" dirty="0" smtClean="0"/>
+            <a:endParaRPr lang="en-US" sz="2000" dirty="0" smtClean="0"/>
           </a:p>
           <a:p>
             <a:pPr marL="285750" indent="-285750">
               <a:buFont typeface="Arial" panose="020B0604020202020204" pitchFamily="34" charset="0"/>
               <a:buChar char="•"/>
             </a:pPr>
-            <a:endParaRPr lang="en-US" b="1" dirty="0" smtClean="0"/>
+            <a:endParaRPr lang="en-US" sz="2000" b="1" dirty="0" smtClean="0"/>
           </a:p>
           <a:p>
             <a:pPr marL="285750" indent="-285750">
@@ -10599,10 +10575,10 @@
               <a:buChar char="•"/>
             </a:pPr>
             <a:r>
-              <a:rPr lang="en-US" dirty="0" smtClean="0"/>
+              <a:rPr lang="en-US" sz="2000" dirty="0" smtClean="0"/>
               <a:t>Begin workshop </a:t>
             </a:r>
-            <a:endParaRPr lang="en-US" dirty="0"/>
+            <a:endParaRPr lang="en-US" sz="2000" dirty="0"/>
           </a:p>
         </p:txBody>
       </p:sp>
@@ -14034,6 +14010,15 @@
 </file>
 
 <file path=customXml/item1.xml><?xml version="1.0" encoding="utf-8"?>
+<p:properties xmlns:p="http://schemas.microsoft.com/office/2006/metadata/properties" xmlns:xsi="http://www.w3.org/2001/XMLSchema-instance" xmlns:pc="http://schemas.microsoft.com/office/infopath/2007/PartnerControls">
+  <documentManagement>
+    <PublishingExpirationDate xmlns="http://schemas.microsoft.com/sharepoint/v3" xsi:nil="true"/>
+    <PublishingStartDate xmlns="http://schemas.microsoft.com/sharepoint/v3" xsi:nil="true"/>
+  </documentManagement>
+</p:properties>
+</file>
+
+<file path=customXml/item2.xml><?xml version="1.0" encoding="utf-8"?>
 <ct:contentTypeSchema xmlns:ct="http://schemas.microsoft.com/office/2006/metadata/contentType" xmlns:ma="http://schemas.microsoft.com/office/2006/metadata/properties/metaAttributes" ct:_="" ma:_="" ma:contentTypeName="Document" ma:contentTypeID="0x0101002EAB9993CCBF73478E12853278F3FB5C" ma:contentTypeVersion="1" ma:contentTypeDescription="Create a new document." ma:contentTypeScope="" ma:versionID="4db10d317033d09fed4d0297d17c663a">
   <xsd:schema xmlns:xsd="http://www.w3.org/2001/XMLSchema" xmlns:xs="http://www.w3.org/2001/XMLSchema" xmlns:p="http://schemas.microsoft.com/office/2006/metadata/properties" xmlns:ns1="http://schemas.microsoft.com/sharepoint/v3" targetNamespace="http://schemas.microsoft.com/office/2006/metadata/properties" ma:root="true" ma:fieldsID="48c5b5cd9b8d25ff6dd15848836f4270" ns1:_="">
     <xsd:import namespace="http://schemas.microsoft.com/sharepoint/v3"/>
@@ -14165,15 +14150,6 @@
 </ct:contentTypeSchema>
 </file>
 
-<file path=customXml/item2.xml><?xml version="1.0" encoding="utf-8"?>
-<p:properties xmlns:p="http://schemas.microsoft.com/office/2006/metadata/properties" xmlns:xsi="http://www.w3.org/2001/XMLSchema-instance" xmlns:pc="http://schemas.microsoft.com/office/infopath/2007/PartnerControls">
-  <documentManagement>
-    <PublishingExpirationDate xmlns="http://schemas.microsoft.com/sharepoint/v3" xsi:nil="true"/>
-    <PublishingStartDate xmlns="http://schemas.microsoft.com/sharepoint/v3" xsi:nil="true"/>
-  </documentManagement>
-</p:properties>
-</file>
-
 <file path=customXml/item3.xml><?xml version="1.0" encoding="utf-8"?>
 <?mso-contentType ?>
 <FormTemplates xmlns="http://schemas.microsoft.com/sharepoint/v3/contenttype/forms">
@@ -14184,6 +14160,22 @@
 </file>
 
 <file path=customXml/itemProps1.xml><?xml version="1.0" encoding="utf-8"?>
+<ds:datastoreItem xmlns:ds="http://schemas.openxmlformats.org/officeDocument/2006/customXml" ds:itemID="{C1424CC9-255C-4972-B5F2-6F19B32F3DEA}">
+  <ds:schemaRefs>
+    <ds:schemaRef ds:uri="http://purl.org/dc/terms/"/>
+    <ds:schemaRef ds:uri="http://schemas.microsoft.com/office/infopath/2007/PartnerControls"/>
+    <ds:schemaRef ds:uri="http://schemas.microsoft.com/sharepoint/v3"/>
+    <ds:schemaRef ds:uri="http://schemas.microsoft.com/office/2006/documentManagement/types"/>
+    <ds:schemaRef ds:uri="http://purl.org/dc/dcmitype/"/>
+    <ds:schemaRef ds:uri="http://purl.org/dc/elements/1.1/"/>
+    <ds:schemaRef ds:uri="http://www.w3.org/XML/1998/namespace"/>
+    <ds:schemaRef ds:uri="http://schemas.openxmlformats.org/package/2006/metadata/core-properties"/>
+    <ds:schemaRef ds:uri="http://schemas.microsoft.com/office/2006/metadata/properties"/>
+  </ds:schemaRefs>
+</ds:datastoreItem>
+</file>
+
+<file path=customXml/itemProps2.xml><?xml version="1.0" encoding="utf-8"?>
 <ds:datastoreItem xmlns:ds="http://schemas.openxmlformats.org/officeDocument/2006/customXml" ds:itemID="{E29AC310-E4D3-4181-8DC8-8BCBD631C9E0}">
   <ds:schemaRefs>
     <ds:schemaRef ds:uri="http://schemas.microsoft.com/office/2006/metadata/contentType"/>
@@ -14201,22 +14193,6 @@
 </ds:datastoreItem>
 </file>
 
-<file path=customXml/itemProps2.xml><?xml version="1.0" encoding="utf-8"?>
-<ds:datastoreItem xmlns:ds="http://schemas.openxmlformats.org/officeDocument/2006/customXml" ds:itemID="{C1424CC9-255C-4972-B5F2-6F19B32F3DEA}">
-  <ds:schemaRefs>
-    <ds:schemaRef ds:uri="http://purl.org/dc/terms/"/>
-    <ds:schemaRef ds:uri="http://schemas.microsoft.com/office/infopath/2007/PartnerControls"/>
-    <ds:schemaRef ds:uri="http://schemas.microsoft.com/sharepoint/v3"/>
-    <ds:schemaRef ds:uri="http://schemas.microsoft.com/office/2006/documentManagement/types"/>
-    <ds:schemaRef ds:uri="http://purl.org/dc/dcmitype/"/>
-    <ds:schemaRef ds:uri="http://purl.org/dc/elements/1.1/"/>
-    <ds:schemaRef ds:uri="http://www.w3.org/XML/1998/namespace"/>
-    <ds:schemaRef ds:uri="http://schemas.openxmlformats.org/package/2006/metadata/core-properties"/>
-    <ds:schemaRef ds:uri="http://schemas.microsoft.com/office/2006/metadata/properties"/>
-  </ds:schemaRefs>
-</ds:datastoreItem>
-</file>
-
 <file path=customXml/itemProps3.xml><?xml version="1.0" encoding="utf-8"?>
 <ds:datastoreItem xmlns:ds="http://schemas.openxmlformats.org/officeDocument/2006/customXml" ds:itemID="{B3E8851E-A513-4DE1-BFEA-60B7444A3522}">
   <ds:schemaRefs>

</xml_diff>

<commit_message>
Update Day 2 Servlets.
</commit_message>
<xml_diff>
--- a/Servlets/Day2/Docs/Web Presentation-Part2.pptx
+++ b/Servlets/Day2/Docs/Web Presentation-Part2.pptx
@@ -6995,8 +6995,8 @@
         </p:blipFill>
         <p:spPr bwMode="auto">
           <a:xfrm>
-            <a:off x="1528762" y="2343150"/>
-            <a:ext cx="6422523" cy="2556228"/>
+            <a:off x="398723" y="2016578"/>
+            <a:ext cx="8745277" cy="3480707"/>
           </a:xfrm>
           <a:prstGeom prst="rect">
             <a:avLst/>
@@ -7750,8 +7750,8 @@
         </p:blipFill>
         <p:spPr bwMode="auto">
           <a:xfrm>
-            <a:off x="476174" y="2042431"/>
-            <a:ext cx="8193238" cy="3737883"/>
+            <a:off x="0" y="1879145"/>
+            <a:ext cx="9147675" cy="4173312"/>
           </a:xfrm>
           <a:prstGeom prst="rect">
             <a:avLst/>

</xml_diff>

<commit_message>
Update Servlets Day2 docs.
</commit_message>
<xml_diff>
--- a/Servlets/Day2/Docs/Web Presentation-Part2.pptx
+++ b/Servlets/Day2/Docs/Web Presentation-Part2.pptx
@@ -8391,25 +8391,25 @@
           <a:lstStyle/>
           <a:p>
             <a:r>
-              <a:rPr lang="en-US" dirty="0" smtClean="0"/>
+              <a:rPr lang="en-US" sz="2000" dirty="0" smtClean="0"/>
               <a:t>What are Servlet Filters?</a:t>
             </a:r>
           </a:p>
           <a:p>
             <a:pPr lvl="1"/>
-            <a:endParaRPr lang="en-US" sz="1800" dirty="0" smtClean="0"/>
+            <a:endParaRPr lang="en-US" sz="2000" dirty="0" smtClean="0"/>
           </a:p>
           <a:p>
             <a:pPr lvl="1"/>
             <a:r>
-              <a:rPr lang="en-US" sz="1800" dirty="0" smtClean="0"/>
+              <a:rPr lang="en-US" sz="2000" dirty="0" smtClean="0"/>
               <a:t>Java classes that can be used in Servlet Programming for:</a:t>
             </a:r>
           </a:p>
           <a:p>
             <a:pPr lvl="2"/>
             <a:r>
-              <a:rPr lang="en-US" sz="1800" dirty="0" smtClean="0"/>
+              <a:rPr lang="en-US" sz="2000" dirty="0" smtClean="0"/>
               <a:t>Intercepting requests from a client before they access </a:t>
             </a:r>
           </a:p>
@@ -8418,14 +8418,14 @@
               <a:buNone/>
             </a:pPr>
             <a:r>
-              <a:rPr lang="en-US" sz="1800" dirty="0" smtClean="0"/>
+              <a:rPr lang="en-US" sz="2000" dirty="0" smtClean="0"/>
               <a:t>a resource from the backend</a:t>
             </a:r>
           </a:p>
           <a:p>
             <a:pPr lvl="2"/>
             <a:r>
-              <a:rPr lang="en-US" sz="1800" dirty="0" smtClean="0"/>
+              <a:rPr lang="en-US" sz="2000" dirty="0" smtClean="0"/>
               <a:t>Manipulate responses from server before they are sent </a:t>
             </a:r>
           </a:p>
@@ -8434,7 +8434,7 @@
               <a:buNone/>
             </a:pPr>
             <a:r>
-              <a:rPr lang="en-US" sz="1800" dirty="0" smtClean="0"/>
+              <a:rPr lang="en-US" sz="2000" dirty="0" smtClean="0"/>
               <a:t>back to the client</a:t>
             </a:r>
           </a:p>
@@ -8505,7 +8505,7 @@
         </p:blipFill>
         <p:spPr bwMode="auto">
           <a:xfrm>
-            <a:off x="1921193" y="3424238"/>
+            <a:off x="2234019" y="3554866"/>
             <a:ext cx="6190844" cy="2866131"/>
           </a:xfrm>
           <a:prstGeom prst="rect">
@@ -8926,7 +8926,11 @@
             </a:r>
             <a:r>
               <a:rPr lang="en-US" sz="2000" dirty="0" smtClean="0"/>
-              <a:t> In this method if you want to continue with the other filters in the chain add at the last code line the following instrunction </a:t>
+              <a:t> In this method if you want to continue with the other filters in the chain add at the last code line the following </a:t>
+            </a:r>
+            <a:r>
+              <a:rPr lang="en-US" sz="2000" dirty="0" smtClean="0"/>
+              <a:t>instruction </a:t>
             </a:r>
             <a:r>
               <a:rPr lang="en-US" sz="2000" b="1" dirty="0"/>

</xml_diff>

<commit_message>
Update Day 2 exercises.
</commit_message>
<xml_diff>
--- a/Servlets/Day2/Docs/Web Presentation-Part2.pptx
+++ b/Servlets/Day2/Docs/Web Presentation-Part2.pptx
@@ -9795,178 +9795,6 @@
           <a:chExt cx="0" cy="0"/>
         </a:xfrm>
       </p:grpSpPr>
-      <p:sp>
-        <p:nvSpPr>
-          <p:cNvPr id="2" name="Title 1"/>
-          <p:cNvSpPr>
-            <a:spLocks noGrp="1"/>
-          </p:cNvSpPr>
-          <p:nvPr>
-            <p:ph type="title"/>
-          </p:nvPr>
-        </p:nvSpPr>
-        <p:spPr>
-          <a:xfrm>
-            <a:off x="999511" y="766826"/>
-            <a:ext cx="2886689" cy="593092"/>
-          </a:xfrm>
-        </p:spPr>
-        <p:txBody>
-          <a:bodyPr/>
-          <a:lstStyle/>
-          <a:p>
-            <a:r>
-              <a:rPr lang="en-US" dirty="0" smtClean="0"/>
-              <a:t>HTTP Session</a:t>
-            </a:r>
-            <a:endParaRPr lang="ro-RO" dirty="0"/>
-          </a:p>
-        </p:txBody>
-      </p:sp>
-      <p:sp>
-        <p:nvSpPr>
-          <p:cNvPr id="4" name="Rectangle 3"/>
-          <p:cNvSpPr/>
-          <p:nvPr/>
-        </p:nvSpPr>
-        <p:spPr>
-          <a:xfrm>
-            <a:off x="620889" y="1725360"/>
-            <a:ext cx="7687733" cy="2327352"/>
-          </a:xfrm>
-          <a:prstGeom prst="rect">
-            <a:avLst/>
-          </a:prstGeom>
-        </p:spPr>
-        <p:txBody>
-          <a:bodyPr wrap="square">
-            <a:spAutoFit/>
-          </a:bodyPr>
-          <a:lstStyle/>
-          <a:p>
-            <a:r>
-              <a:rPr lang="en-US" dirty="0">
-                <a:solidFill>
-                  <a:srgbClr val="565A5C"/>
-                </a:solidFill>
-                <a:latin typeface="Arial"/>
-                <a:cs typeface="Arial"/>
-              </a:rPr>
-              <a:t>The</a:t>
-            </a:r>
-            <a:r>
-              <a:rPr lang="en-US" dirty="0">
-                <a:solidFill>
-                  <a:srgbClr val="000000"/>
-                </a:solidFill>
-                <a:latin typeface="verdana" panose="020B0604030504040204" pitchFamily="34" charset="0"/>
-              </a:rPr>
-              <a:t> </a:t>
-            </a:r>
-            <a:r>
-              <a:rPr lang="en-US" dirty="0">
-                <a:solidFill>
-                  <a:srgbClr val="565A5C"/>
-                </a:solidFill>
-                <a:latin typeface="Arial"/>
-                <a:cs typeface="Arial"/>
-              </a:rPr>
-              <a:t>HttpServletRequest</a:t>
-            </a:r>
-            <a:r>
-              <a:rPr lang="en-US" dirty="0">
-                <a:solidFill>
-                  <a:srgbClr val="000000"/>
-                </a:solidFill>
-                <a:latin typeface="verdana" panose="020B0604030504040204" pitchFamily="34" charset="0"/>
-              </a:rPr>
-              <a:t> </a:t>
-            </a:r>
-            <a:r>
-              <a:rPr lang="en-US" dirty="0">
-                <a:solidFill>
-                  <a:srgbClr val="565A5C"/>
-                </a:solidFill>
-                <a:latin typeface="Arial"/>
-                <a:cs typeface="Arial"/>
-              </a:rPr>
-              <a:t>interface provides two methods to get the object of HttpSession:</a:t>
-            </a:r>
-          </a:p>
-          <a:p>
-            <a:pPr>
-              <a:buFont typeface="+mj-lt"/>
-              <a:buAutoNum type="arabicPeriod"/>
-            </a:pPr>
-            <a:r>
-              <a:rPr lang="en-US" dirty="0">
-                <a:solidFill>
-                  <a:srgbClr val="565A5C"/>
-                </a:solidFill>
-                <a:latin typeface="Arial"/>
-                <a:cs typeface="Arial"/>
-              </a:rPr>
-              <a:t> public HttpSession </a:t>
-            </a:r>
-            <a:r>
-              <a:rPr lang="en-US" b="1" dirty="0">
-                <a:solidFill>
-                  <a:srgbClr val="565A5C"/>
-                </a:solidFill>
-                <a:latin typeface="Arial"/>
-                <a:cs typeface="Arial"/>
-              </a:rPr>
-              <a:t>getSession()</a:t>
-            </a:r>
-            <a:r>
-              <a:rPr lang="en-US" dirty="0">
-                <a:solidFill>
-                  <a:srgbClr val="565A5C"/>
-                </a:solidFill>
-                <a:latin typeface="Arial"/>
-                <a:cs typeface="Arial"/>
-              </a:rPr>
-              <a:t>:Returns the current session associated with this request, or if the request does not have a session, creates one.</a:t>
-            </a:r>
-          </a:p>
-          <a:p>
-            <a:pPr>
-              <a:buFont typeface="+mj-lt"/>
-              <a:buAutoNum type="arabicPeriod"/>
-            </a:pPr>
-            <a:r>
-              <a:rPr lang="en-US" dirty="0">
-                <a:solidFill>
-                  <a:srgbClr val="565A5C"/>
-                </a:solidFill>
-                <a:latin typeface="Arial"/>
-                <a:cs typeface="Arial"/>
-              </a:rPr>
-              <a:t> public HttpSession </a:t>
-            </a:r>
-            <a:r>
-              <a:rPr lang="en-US" b="1" dirty="0">
-                <a:solidFill>
-                  <a:srgbClr val="565A5C"/>
-                </a:solidFill>
-                <a:latin typeface="Arial"/>
-                <a:cs typeface="Arial"/>
-              </a:rPr>
-              <a:t>getSession(boolean create)</a:t>
-            </a:r>
-            <a:r>
-              <a:rPr lang="en-US" dirty="0">
-                <a:solidFill>
-                  <a:srgbClr val="565A5C"/>
-                </a:solidFill>
-                <a:latin typeface="Arial"/>
-                <a:cs typeface="Arial"/>
-              </a:rPr>
-              <a:t>:Returns the current HttpSession associated with this request or, if there is no current session and create is true, returns a new session.</a:t>
-            </a:r>
-          </a:p>
-        </p:txBody>
-      </p:sp>
       <p:pic>
         <p:nvPicPr>
           <p:cNvPr id="1026" name="Picture 2" descr="HttpSession object"/>
@@ -9990,7 +9818,7 @@
         </p:blipFill>
         <p:spPr bwMode="auto">
           <a:xfrm>
-            <a:off x="2529240" y="3939822"/>
+            <a:off x="2442855" y="4035706"/>
             <a:ext cx="6282981" cy="2714009"/>
           </a:xfrm>
           <a:prstGeom prst="rect">
@@ -10008,6 +9836,218 @@
           </a:extLst>
         </p:spPr>
       </p:pic>
+      <p:sp>
+        <p:nvSpPr>
+          <p:cNvPr id="2" name="Title 1"/>
+          <p:cNvSpPr>
+            <a:spLocks noGrp="1"/>
+          </p:cNvSpPr>
+          <p:nvPr>
+            <p:ph type="title"/>
+          </p:nvPr>
+        </p:nvSpPr>
+        <p:spPr>
+          <a:xfrm>
+            <a:off x="999511" y="766826"/>
+            <a:ext cx="2886689" cy="593092"/>
+          </a:xfrm>
+        </p:spPr>
+        <p:txBody>
+          <a:bodyPr/>
+          <a:lstStyle/>
+          <a:p>
+            <a:r>
+              <a:rPr lang="en-US" dirty="0" smtClean="0"/>
+              <a:t>HTTP Session</a:t>
+            </a:r>
+            <a:endParaRPr lang="ro-RO" dirty="0"/>
+          </a:p>
+        </p:txBody>
+      </p:sp>
+      <p:sp>
+        <p:nvSpPr>
+          <p:cNvPr id="4" name="Rectangle 3"/>
+          <p:cNvSpPr/>
+          <p:nvPr/>
+        </p:nvSpPr>
+        <p:spPr>
+          <a:xfrm>
+            <a:off x="620889" y="1630385"/>
+            <a:ext cx="7687733" cy="2554545"/>
+          </a:xfrm>
+          <a:prstGeom prst="rect">
+            <a:avLst/>
+          </a:prstGeom>
+        </p:spPr>
+        <p:txBody>
+          <a:bodyPr wrap="square">
+            <a:spAutoFit/>
+          </a:bodyPr>
+          <a:lstStyle/>
+          <a:p>
+            <a:r>
+              <a:rPr lang="en-US" sz="2000" dirty="0">
+                <a:solidFill>
+                  <a:srgbClr val="565A5C"/>
+                </a:solidFill>
+                <a:latin typeface="Arial"/>
+                <a:cs typeface="Arial"/>
+              </a:rPr>
+              <a:t>The</a:t>
+            </a:r>
+            <a:r>
+              <a:rPr lang="en-US" sz="2000" dirty="0">
+                <a:solidFill>
+                  <a:srgbClr val="000000"/>
+                </a:solidFill>
+                <a:latin typeface="verdana" panose="020B0604030504040204" pitchFamily="34" charset="0"/>
+              </a:rPr>
+              <a:t> </a:t>
+            </a:r>
+            <a:r>
+              <a:rPr lang="en-US" sz="2000" b="1" dirty="0">
+                <a:solidFill>
+                  <a:srgbClr val="565A5C"/>
+                </a:solidFill>
+                <a:latin typeface="Arial"/>
+                <a:cs typeface="Arial"/>
+              </a:rPr>
+              <a:t>HttpServletRequest</a:t>
+            </a:r>
+            <a:r>
+              <a:rPr lang="en-US" sz="2000" dirty="0">
+                <a:solidFill>
+                  <a:srgbClr val="000000"/>
+                </a:solidFill>
+                <a:latin typeface="verdana" panose="020B0604030504040204" pitchFamily="34" charset="0"/>
+              </a:rPr>
+              <a:t> </a:t>
+            </a:r>
+            <a:r>
+              <a:rPr lang="en-US" sz="2000" dirty="0">
+                <a:solidFill>
+                  <a:srgbClr val="565A5C"/>
+                </a:solidFill>
+                <a:latin typeface="Arial"/>
+                <a:cs typeface="Arial"/>
+              </a:rPr>
+              <a:t>interface provides two methods to get the object of HttpSession:</a:t>
+            </a:r>
+          </a:p>
+          <a:p>
+            <a:pPr>
+              <a:buFont typeface="+mj-lt"/>
+              <a:buAutoNum type="arabicPeriod"/>
+            </a:pPr>
+            <a:r>
+              <a:rPr lang="en-US" sz="2000" dirty="0">
+                <a:solidFill>
+                  <a:srgbClr val="565A5C"/>
+                </a:solidFill>
+                <a:latin typeface="Arial"/>
+                <a:cs typeface="Arial"/>
+              </a:rPr>
+              <a:t> public HttpSession </a:t>
+            </a:r>
+            <a:r>
+              <a:rPr lang="en-US" sz="2000" b="1" dirty="0">
+                <a:solidFill>
+                  <a:srgbClr val="565A5C"/>
+                </a:solidFill>
+                <a:latin typeface="Arial"/>
+                <a:cs typeface="Arial"/>
+              </a:rPr>
+              <a:t>getSession</a:t>
+            </a:r>
+            <a:r>
+              <a:rPr lang="en-US" sz="2000" b="1" dirty="0" smtClean="0">
+                <a:solidFill>
+                  <a:srgbClr val="565A5C"/>
+                </a:solidFill>
+                <a:latin typeface="Arial"/>
+                <a:cs typeface="Arial"/>
+              </a:rPr>
+              <a:t>()</a:t>
+            </a:r>
+            <a:r>
+              <a:rPr lang="en-US" sz="2000" dirty="0" smtClean="0">
+                <a:solidFill>
+                  <a:srgbClr val="565A5C"/>
+                </a:solidFill>
+                <a:latin typeface="Arial"/>
+                <a:cs typeface="Arial"/>
+              </a:rPr>
+              <a:t>: Returns </a:t>
+            </a:r>
+            <a:r>
+              <a:rPr lang="en-US" sz="2000" dirty="0">
+                <a:solidFill>
+                  <a:srgbClr val="565A5C"/>
+                </a:solidFill>
+                <a:latin typeface="Arial"/>
+                <a:cs typeface="Arial"/>
+              </a:rPr>
+              <a:t>the current session associated with this request, or if the request does not have a session, creates one.</a:t>
+            </a:r>
+          </a:p>
+          <a:p>
+            <a:pPr>
+              <a:buFont typeface="+mj-lt"/>
+              <a:buAutoNum type="arabicPeriod"/>
+            </a:pPr>
+            <a:r>
+              <a:rPr lang="en-US" sz="2000" dirty="0">
+                <a:solidFill>
+                  <a:srgbClr val="565A5C"/>
+                </a:solidFill>
+                <a:latin typeface="Arial"/>
+                <a:cs typeface="Arial"/>
+              </a:rPr>
+              <a:t> public HttpSession </a:t>
+            </a:r>
+            <a:r>
+              <a:rPr lang="en-US" sz="2000" b="1" dirty="0">
+                <a:solidFill>
+                  <a:srgbClr val="565A5C"/>
+                </a:solidFill>
+                <a:latin typeface="Arial"/>
+                <a:cs typeface="Arial"/>
+              </a:rPr>
+              <a:t>getSession(boolean create</a:t>
+            </a:r>
+            <a:r>
+              <a:rPr lang="en-US" sz="2000" b="1" dirty="0" smtClean="0">
+                <a:solidFill>
+                  <a:srgbClr val="565A5C"/>
+                </a:solidFill>
+                <a:latin typeface="Arial"/>
+                <a:cs typeface="Arial"/>
+              </a:rPr>
+              <a:t>)</a:t>
+            </a:r>
+            <a:r>
+              <a:rPr lang="en-US" sz="2000" dirty="0" smtClean="0">
+                <a:solidFill>
+                  <a:srgbClr val="565A5C"/>
+                </a:solidFill>
+                <a:latin typeface="Arial"/>
+                <a:cs typeface="Arial"/>
+              </a:rPr>
+              <a:t>: Returns </a:t>
+            </a:r>
+            <a:r>
+              <a:rPr lang="en-US" sz="2000" dirty="0">
+                <a:solidFill>
+                  <a:srgbClr val="565A5C"/>
+                </a:solidFill>
+                <a:latin typeface="Arial"/>
+                <a:cs typeface="Arial"/>
+              </a:rPr>
+              <a:t>the current HttpSession associated with this request or, if there is no current session and create is true, returns a new session.</a:t>
+            </a:r>
+          </a:p>
+        </p:txBody>
+      </p:sp>
     </p:spTree>
     <p:extLst>
       <p:ext uri="{BB962C8B-B14F-4D97-AF65-F5344CB8AC3E}">
@@ -10085,313 +10125,245 @@
         </p:nvSpPr>
         <p:spPr>
           <a:xfrm>
-            <a:off x="720724" y="1504420"/>
-            <a:ext cx="8062031" cy="5222952"/>
+            <a:off x="720724" y="1359918"/>
+            <a:ext cx="8062031" cy="5016346"/>
           </a:xfrm>
         </p:spPr>
         <p:txBody>
           <a:bodyPr>
-            <a:normAutofit fontScale="40000" lnSpcReduction="20000"/>
+            <a:normAutofit fontScale="32500" lnSpcReduction="20000"/>
           </a:bodyPr>
           <a:lstStyle/>
           <a:p>
             <a:pPr algn="l"/>
-            <a:endParaRPr lang="en-US" dirty="0" smtClean="0"/>
+            <a:r>
+              <a:rPr lang="en-US" sz="6200" dirty="0" smtClean="0"/>
+              <a:t>HttpSession </a:t>
+            </a:r>
+            <a:r>
+              <a:rPr lang="en-US" sz="6200" dirty="0" smtClean="0"/>
+              <a:t>most important methods are</a:t>
+            </a:r>
+            <a:r>
+              <a:rPr lang="en-US" sz="6200" dirty="0" smtClean="0"/>
+              <a:t>:</a:t>
+            </a:r>
           </a:p>
           <a:p>
             <a:pPr algn="l"/>
-            <a:endParaRPr lang="en-US" dirty="0" smtClean="0"/>
+            <a:endParaRPr lang="en-US" sz="6200" dirty="0" smtClean="0"/>
+          </a:p>
+          <a:p>
+            <a:pPr lvl="2" algn="l"/>
+            <a:r>
+              <a:rPr lang="en-US" sz="4900" b="1" dirty="0" err="1" smtClean="0">
+                <a:hlinkClick r:id="rId2"/>
+              </a:rPr>
+              <a:t>getAttribute</a:t>
+            </a:r>
+            <a:r>
+              <a:rPr lang="en-US" sz="4900" b="1" dirty="0" smtClean="0"/>
+              <a:t>(</a:t>
+            </a:r>
+            <a:r>
+              <a:rPr lang="en-US" sz="4900" dirty="0" smtClean="0">
+                <a:hlinkClick r:id="rId3" tooltip="class or interface in java.lang"/>
+              </a:rPr>
+              <a:t>String</a:t>
+            </a:r>
+            <a:r>
+              <a:rPr lang="en-US" sz="4900" dirty="0" smtClean="0"/>
+              <a:t> name) </a:t>
+            </a:r>
+            <a:br>
+              <a:rPr lang="en-US" sz="4900" dirty="0" smtClean="0"/>
+            </a:br>
+            <a:r>
+              <a:rPr lang="en-US" sz="4900" dirty="0" smtClean="0"/>
+              <a:t>          Returns the object bound with the specified name in this session, or null if no object is bound under the name.</a:t>
+            </a:r>
+          </a:p>
+          <a:p>
+            <a:pPr lvl="2" algn="l"/>
+            <a:r>
+              <a:rPr lang="en-US" sz="4900" b="1" dirty="0" err="1" smtClean="0">
+                <a:hlinkClick r:id="rId2"/>
+              </a:rPr>
+              <a:t>setAttribute</a:t>
+            </a:r>
+            <a:r>
+              <a:rPr lang="en-US" sz="4900" dirty="0" smtClean="0"/>
+              <a:t>(</a:t>
+            </a:r>
+            <a:r>
+              <a:rPr lang="en-US" sz="4900" dirty="0" smtClean="0">
+                <a:hlinkClick r:id="rId3" tooltip="class or interface in java.lang"/>
+              </a:rPr>
+              <a:t>String</a:t>
+            </a:r>
+            <a:r>
+              <a:rPr lang="en-US" sz="4900" dirty="0" smtClean="0"/>
+              <a:t> name, </a:t>
+            </a:r>
+            <a:r>
+              <a:rPr lang="en-US" sz="4900" dirty="0" smtClean="0">
+                <a:hlinkClick r:id="rId4" tooltip="class or interface in java.lang"/>
+              </a:rPr>
+              <a:t>Object</a:t>
+            </a:r>
+            <a:r>
+              <a:rPr lang="en-US" sz="4900" dirty="0" smtClean="0"/>
+              <a:t> value) </a:t>
+            </a:r>
+            <a:br>
+              <a:rPr lang="en-US" sz="4900" dirty="0" smtClean="0"/>
+            </a:br>
+            <a:r>
+              <a:rPr lang="en-US" sz="4900" dirty="0" smtClean="0"/>
+              <a:t>          Binds an object to this session, using the name specified.</a:t>
+            </a:r>
+          </a:p>
+          <a:p>
+            <a:pPr lvl="2" algn="l"/>
+            <a:r>
+              <a:rPr lang="en-US" sz="4900" b="1" dirty="0" err="1" smtClean="0">
+                <a:hlinkClick r:id="rId2"/>
+              </a:rPr>
+              <a:t>getAttributeNames</a:t>
+            </a:r>
+            <a:r>
+              <a:rPr lang="en-US" sz="4900" dirty="0" smtClean="0"/>
+              <a:t>() </a:t>
+            </a:r>
+            <a:br>
+              <a:rPr lang="en-US" sz="4900" dirty="0" smtClean="0"/>
+            </a:br>
+            <a:r>
+              <a:rPr lang="en-US" sz="4900" dirty="0" smtClean="0"/>
+              <a:t>          Returns an Enumeration of String objects containing the names of all the objects bound to this session.</a:t>
+            </a:r>
+          </a:p>
+          <a:p>
+            <a:pPr lvl="2" algn="l"/>
+            <a:r>
+              <a:rPr lang="en-US" sz="4900" b="1" dirty="0" err="1" smtClean="0">
+                <a:hlinkClick r:id="rId2"/>
+              </a:rPr>
+              <a:t>getId</a:t>
+            </a:r>
+            <a:r>
+              <a:rPr lang="en-US" sz="4900" dirty="0" smtClean="0"/>
+              <a:t>() </a:t>
+            </a:r>
+            <a:br>
+              <a:rPr lang="en-US" sz="4900" dirty="0" smtClean="0"/>
+            </a:br>
+            <a:r>
+              <a:rPr lang="en-US" sz="4900" dirty="0" smtClean="0"/>
+              <a:t>          Returns a string containing the unique identifier assigned to this session.</a:t>
+            </a:r>
+          </a:p>
+          <a:p>
+            <a:pPr lvl="2" algn="l"/>
+            <a:r>
+              <a:rPr lang="en-US" sz="4900" b="1" dirty="0" smtClean="0">
+                <a:hlinkClick r:id="rId2"/>
+              </a:rPr>
+              <a:t>invalidate</a:t>
+            </a:r>
+            <a:r>
+              <a:rPr lang="en-US" sz="4900" dirty="0" smtClean="0"/>
+              <a:t>() </a:t>
+            </a:r>
+            <a:br>
+              <a:rPr lang="en-US" sz="4900" dirty="0" smtClean="0"/>
+            </a:br>
+            <a:r>
+              <a:rPr lang="en-US" sz="4900" dirty="0" smtClean="0"/>
+              <a:t>          Invalidates this session then unbinds any objects bound to it.</a:t>
+            </a:r>
+          </a:p>
+          <a:p>
+            <a:pPr lvl="2" algn="l"/>
+            <a:r>
+              <a:rPr lang="en-US" sz="4900" b="1" dirty="0" err="1" smtClean="0">
+                <a:hlinkClick r:id="rId2"/>
+              </a:rPr>
+              <a:t>removeAttribute</a:t>
+            </a:r>
+            <a:r>
+              <a:rPr lang="en-US" sz="4900" dirty="0" smtClean="0"/>
+              <a:t>(</a:t>
+            </a:r>
+            <a:r>
+              <a:rPr lang="en-US" sz="4900" dirty="0" smtClean="0">
+                <a:hlinkClick r:id="rId3" tooltip="class or interface in java.lang"/>
+              </a:rPr>
+              <a:t>String</a:t>
+            </a:r>
+            <a:r>
+              <a:rPr lang="en-US" sz="4900" dirty="0" smtClean="0"/>
+              <a:t> name) </a:t>
+            </a:r>
+            <a:br>
+              <a:rPr lang="en-US" sz="4900" dirty="0" smtClean="0"/>
+            </a:br>
+            <a:r>
+              <a:rPr lang="en-US" sz="4900" dirty="0" smtClean="0"/>
+              <a:t>          Removes the object bound with the specified name from this session.</a:t>
+            </a:r>
+          </a:p>
+          <a:p>
+            <a:pPr lvl="2" algn="l"/>
+            <a:r>
+              <a:rPr lang="en-US" sz="4900" b="1" dirty="0" smtClean="0">
+                <a:hlinkClick r:id="rId2"/>
+              </a:rPr>
+              <a:t>setMaxInactiveInterval</a:t>
+            </a:r>
+            <a:r>
+              <a:rPr lang="en-US" sz="4900" dirty="0" smtClean="0"/>
+              <a:t>(</a:t>
+            </a:r>
+            <a:r>
+              <a:rPr lang="en-US" sz="4900" dirty="0" err="1" smtClean="0"/>
+              <a:t>int</a:t>
+            </a:r>
+            <a:r>
+              <a:rPr lang="en-US" sz="4900" dirty="0" smtClean="0"/>
+              <a:t> interval) </a:t>
+            </a:r>
+            <a:br>
+              <a:rPr lang="en-US" sz="4900" dirty="0" smtClean="0"/>
+            </a:br>
+            <a:r>
+              <a:rPr lang="en-US" sz="4900" dirty="0" smtClean="0"/>
+              <a:t>          Specifies the time, in seconds, between client requests before the servlet container will invalidate this session.</a:t>
+            </a:r>
+          </a:p>
+          <a:p>
+            <a:pPr lvl="2" algn="l"/>
+            <a:endParaRPr lang="en-US" sz="4900" dirty="0" smtClean="0"/>
           </a:p>
           <a:p>
             <a:pPr algn="l"/>
-            <a:endParaRPr lang="en-US" dirty="0" smtClean="0"/>
-          </a:p>
-          <a:p>
-            <a:pPr algn="l"/>
-            <a:endParaRPr lang="en-US" dirty="0" smtClean="0"/>
-          </a:p>
-          <a:p>
-            <a:pPr algn="l"/>
-            <a:endParaRPr lang="en-US" dirty="0" smtClean="0"/>
-          </a:p>
-          <a:p>
-            <a:pPr algn="l"/>
-            <a:r>
-              <a:rPr lang="en-US" sz="4000" dirty="0" smtClean="0"/>
-              <a:t>HttpSession object could be retrieved from the current HttpServletRequest object</a:t>
-            </a:r>
-          </a:p>
-          <a:p>
-            <a:pPr algn="l"/>
-            <a:endParaRPr lang="en-US" sz="4000" dirty="0" smtClean="0"/>
-          </a:p>
-          <a:p>
-            <a:pPr algn="l"/>
-            <a:r>
-              <a:rPr lang="en-US" sz="4000" dirty="0" smtClean="0"/>
-              <a:t>HttpSession most important methods are:</a:t>
-            </a:r>
-          </a:p>
-          <a:p>
-            <a:pPr lvl="2" algn="l"/>
-            <a:r>
-              <a:rPr lang="en-US" sz="4000" b="1" dirty="0" err="1" smtClean="0">
-                <a:hlinkClick r:id="rId2"/>
-              </a:rPr>
-              <a:t>getAttribute</a:t>
-            </a:r>
-            <a:r>
-              <a:rPr lang="en-US" sz="4000" b="1" dirty="0" smtClean="0"/>
-              <a:t>(</a:t>
-            </a:r>
-            <a:r>
-              <a:rPr lang="en-US" sz="4000" dirty="0" smtClean="0">
-                <a:hlinkClick r:id="rId3" tooltip="class or interface in java.lang"/>
-              </a:rPr>
-              <a:t>String</a:t>
-            </a:r>
-            <a:r>
-              <a:rPr lang="en-US" sz="4000" dirty="0" smtClean="0"/>
-              <a:t> name) </a:t>
-            </a:r>
-            <a:br>
-              <a:rPr lang="en-US" sz="4000" dirty="0" smtClean="0"/>
-            </a:br>
-            <a:r>
-              <a:rPr lang="en-US" sz="4000" dirty="0" smtClean="0"/>
-              <a:t>          Returns the object bound with the specified name in this session, or null if no object is bound under the name.</a:t>
-            </a:r>
-          </a:p>
-          <a:p>
-            <a:pPr lvl="2" algn="l"/>
-            <a:r>
-              <a:rPr lang="en-US" sz="4000" b="1" dirty="0" err="1" smtClean="0">
-                <a:hlinkClick r:id="rId2"/>
-              </a:rPr>
-              <a:t>setAttribute</a:t>
-            </a:r>
-            <a:r>
-              <a:rPr lang="en-US" sz="4000" dirty="0" smtClean="0"/>
-              <a:t>(</a:t>
-            </a:r>
-            <a:r>
-              <a:rPr lang="en-US" sz="4000" dirty="0" smtClean="0">
-                <a:hlinkClick r:id="rId3" tooltip="class or interface in java.lang"/>
-              </a:rPr>
-              <a:t>String</a:t>
-            </a:r>
-            <a:r>
-              <a:rPr lang="en-US" sz="4000" dirty="0" smtClean="0"/>
-              <a:t> name, </a:t>
-            </a:r>
-            <a:r>
-              <a:rPr lang="en-US" sz="4000" dirty="0" smtClean="0">
-                <a:hlinkClick r:id="rId4" tooltip="class or interface in java.lang"/>
-              </a:rPr>
-              <a:t>Object</a:t>
-            </a:r>
-            <a:r>
-              <a:rPr lang="en-US" sz="4000" dirty="0" smtClean="0"/>
-              <a:t> value) </a:t>
-            </a:r>
-            <a:br>
-              <a:rPr lang="en-US" sz="4000" dirty="0" smtClean="0"/>
-            </a:br>
-            <a:r>
-              <a:rPr lang="en-US" sz="4000" dirty="0" smtClean="0"/>
-              <a:t>          Binds an object to this session, using the name specified.</a:t>
-            </a:r>
-          </a:p>
-          <a:p>
-            <a:pPr lvl="2" algn="l"/>
-            <a:r>
-              <a:rPr lang="en-US" sz="4000" b="1" dirty="0" err="1" smtClean="0">
-                <a:hlinkClick r:id="rId2"/>
-              </a:rPr>
-              <a:t>getAttributeNames</a:t>
-            </a:r>
-            <a:r>
-              <a:rPr lang="en-US" sz="4000" dirty="0" smtClean="0"/>
-              <a:t>() </a:t>
-            </a:r>
-            <a:br>
-              <a:rPr lang="en-US" sz="4000" dirty="0" smtClean="0"/>
-            </a:br>
-            <a:r>
-              <a:rPr lang="en-US" sz="4000" dirty="0" smtClean="0"/>
-              <a:t>          Returns an Enumeration of String objects containing the names of all the objects bound to this session.</a:t>
-            </a:r>
-          </a:p>
-          <a:p>
-            <a:pPr lvl="2" algn="l"/>
-            <a:r>
-              <a:rPr lang="en-US" sz="4000" b="1" dirty="0" err="1" smtClean="0">
-                <a:hlinkClick r:id="rId2"/>
-              </a:rPr>
-              <a:t>getId</a:t>
-            </a:r>
-            <a:r>
-              <a:rPr lang="en-US" sz="4000" dirty="0" smtClean="0"/>
-              <a:t>() </a:t>
-            </a:r>
-            <a:br>
-              <a:rPr lang="en-US" sz="4000" dirty="0" smtClean="0"/>
-            </a:br>
-            <a:r>
-              <a:rPr lang="en-US" sz="4000" dirty="0" smtClean="0"/>
-              <a:t>          Returns a string containing the unique identifier assigned to this session.</a:t>
-            </a:r>
-          </a:p>
-          <a:p>
-            <a:pPr lvl="2" algn="l"/>
-            <a:r>
-              <a:rPr lang="en-US" sz="4000" b="1" dirty="0" smtClean="0">
-                <a:hlinkClick r:id="rId2"/>
-              </a:rPr>
-              <a:t>invalidate</a:t>
-            </a:r>
-            <a:r>
-              <a:rPr lang="en-US" sz="4000" dirty="0" smtClean="0"/>
-              <a:t>() </a:t>
-            </a:r>
-            <a:br>
-              <a:rPr lang="en-US" sz="4000" dirty="0" smtClean="0"/>
-            </a:br>
-            <a:r>
-              <a:rPr lang="en-US" sz="4000" dirty="0" smtClean="0"/>
-              <a:t>          Invalidates this session then unbinds any objects bound to it.</a:t>
-            </a:r>
-          </a:p>
-          <a:p>
-            <a:pPr lvl="2" algn="l"/>
-            <a:r>
-              <a:rPr lang="en-US" sz="4000" b="1" dirty="0" err="1" smtClean="0">
-                <a:hlinkClick r:id="rId2"/>
-              </a:rPr>
-              <a:t>removeAttribute</a:t>
-            </a:r>
-            <a:r>
-              <a:rPr lang="en-US" sz="4000" dirty="0" smtClean="0"/>
-              <a:t>(</a:t>
-            </a:r>
-            <a:r>
-              <a:rPr lang="en-US" sz="4000" dirty="0" smtClean="0">
-                <a:hlinkClick r:id="rId3" tooltip="class or interface in java.lang"/>
-              </a:rPr>
-              <a:t>String</a:t>
-            </a:r>
-            <a:r>
-              <a:rPr lang="en-US" sz="4000" dirty="0" smtClean="0"/>
-              <a:t> name) </a:t>
-            </a:r>
-            <a:br>
-              <a:rPr lang="en-US" sz="4000" dirty="0" smtClean="0"/>
-            </a:br>
-            <a:r>
-              <a:rPr lang="en-US" sz="4000" dirty="0" smtClean="0"/>
-              <a:t>          Removes the object bound with the specified name from this session.</a:t>
-            </a:r>
-          </a:p>
-          <a:p>
-            <a:pPr lvl="2" algn="l"/>
-            <a:r>
-              <a:rPr lang="en-US" sz="4000" b="1" dirty="0" smtClean="0">
-                <a:hlinkClick r:id="rId2"/>
-              </a:rPr>
-              <a:t>setMaxInactiveInterval</a:t>
-            </a:r>
-            <a:r>
-              <a:rPr lang="en-US" sz="4000" dirty="0" smtClean="0"/>
-              <a:t>(</a:t>
-            </a:r>
-            <a:r>
-              <a:rPr lang="en-US" sz="4000" dirty="0" err="1" smtClean="0"/>
-              <a:t>int</a:t>
-            </a:r>
-            <a:r>
-              <a:rPr lang="en-US" sz="4000" dirty="0" smtClean="0"/>
-              <a:t> interval) </a:t>
-            </a:r>
-            <a:br>
-              <a:rPr lang="en-US" sz="4000" dirty="0" smtClean="0"/>
-            </a:br>
-            <a:r>
-              <a:rPr lang="en-US" sz="4000" dirty="0" smtClean="0"/>
-              <a:t>          Specifies the time, in seconds, between client requests before the servlet container will invalidate this session.</a:t>
-            </a:r>
-          </a:p>
-          <a:p>
-            <a:pPr lvl="2" algn="l"/>
-            <a:endParaRPr lang="en-US" sz="4000" dirty="0" smtClean="0"/>
-          </a:p>
-          <a:p>
-            <a:pPr algn="l"/>
-            <a:r>
-              <a:rPr lang="en-US" sz="4000" dirty="0" smtClean="0"/>
+            <a:r>
+              <a:rPr lang="en-US" sz="5500" dirty="0" smtClean="0"/>
               <a:t>In our </a:t>
             </a:r>
             <a:r>
-              <a:rPr lang="en-US" sz="4000" b="1" dirty="0" smtClean="0"/>
+              <a:rPr lang="en-US" sz="5500" b="1" dirty="0" smtClean="0"/>
               <a:t>web.xml</a:t>
             </a:r>
             <a:r>
-              <a:rPr lang="en-US" sz="4000" dirty="0" smtClean="0"/>
-              <a:t> deployment descriptor file we can set the timeout of all http sessions</a:t>
-            </a:r>
-          </a:p>
-          <a:p>
-            <a:pPr lvl="2" algn="l"/>
-            <a:endParaRPr lang="en-US" dirty="0" smtClean="0"/>
-          </a:p>
-          <a:p>
-            <a:pPr lvl="1"/>
-            <a:endParaRPr lang="en-US" b="1" dirty="0" smtClean="0"/>
-          </a:p>
-          <a:p>
-            <a:pPr lvl="1"/>
-            <a:endParaRPr lang="en-US" b="1" dirty="0" smtClean="0"/>
-          </a:p>
-          <a:p>
-            <a:pPr lvl="1"/>
-            <a:endParaRPr lang="en-US" b="1" dirty="0" smtClean="0"/>
-          </a:p>
-          <a:p>
-            <a:pPr lvl="1"/>
-            <a:endParaRPr lang="en-US" b="1" dirty="0" smtClean="0"/>
-          </a:p>
-          <a:p>
-            <a:pPr lvl="1"/>
-            <a:endParaRPr lang="en-US" b="1" dirty="0" smtClean="0"/>
-          </a:p>
-          <a:p>
-            <a:pPr lvl="1"/>
-            <a:endParaRPr lang="en-US" b="1" dirty="0" smtClean="0"/>
-          </a:p>
-          <a:p>
-            <a:pPr lvl="1"/>
-            <a:endParaRPr lang="en-US" b="1" dirty="0" smtClean="0"/>
-          </a:p>
-          <a:p>
-            <a:pPr lvl="1"/>
-            <a:endParaRPr lang="en-US" b="1" dirty="0" smtClean="0"/>
-          </a:p>
-          <a:p>
-            <a:pPr lvl="1"/>
-            <a:endParaRPr lang="en-US" b="1" dirty="0" smtClean="0"/>
-          </a:p>
-          <a:p>
-            <a:pPr lvl="1"/>
-            <a:endParaRPr lang="en-US" b="1" dirty="0" smtClean="0"/>
-          </a:p>
-          <a:p>
-            <a:pPr lvl="1"/>
-            <a:endParaRPr lang="en-US" dirty="0" smtClean="0"/>
-          </a:p>
-          <a:p>
-            <a:endParaRPr lang="en-US" dirty="0"/>
-          </a:p>
-          <a:p>
-            <a:endParaRPr lang="ro-RO" dirty="0"/>
+              <a:rPr lang="en-US" sz="5500" dirty="0" smtClean="0"/>
+              <a:t> deployment descriptor file we can set the timeout of all http </a:t>
+            </a:r>
+            <a:r>
+              <a:rPr lang="en-US" sz="5500" dirty="0" smtClean="0"/>
+              <a:t>sessions</a:t>
+            </a:r>
+            <a:endParaRPr lang="ro-RO" sz="5500" dirty="0"/>
           </a:p>
         </p:txBody>
       </p:sp>

</xml_diff>